<commit_message>
Finished the login, register, and my account pages.  Tried to fix gulp problems.  Added form validation to user pages.  Fixed up order listing pages and angular-toastr messages.
</commit_message>
<xml_diff>
--- a/Project Docs/Team8 Super 8 pizza System Design Update.pptx
+++ b/Project Docs/Team8 Super 8 pizza System Design Update.pptx
@@ -233,7 +233,7 @@
   </p:defaultTextStyle>
   <p:extLst>
     <p:ext uri="{EFAFB233-063F-42B5-8137-9DF3F51BA10A}">
-      <p15:sldGuideLst xmlns:p15="http://schemas.microsoft.com/office/powerpoint/2012/main" xmlns="">
+      <p15:sldGuideLst xmlns="" xmlns:p15="http://schemas.microsoft.com/office/powerpoint/2012/main">
         <p15:guide id="1" orient="horz" pos="2160">
           <p15:clr>
             <a:srgbClr val="A4A3A4"/>
@@ -6710,7 +6710,7 @@
         <p:spPr>
           <a:xfrm>
             <a:off x="914400" y="609600"/>
-            <a:ext cx="6019800" cy="5355313"/>
+            <a:ext cx="6019800" cy="5078314"/>
           </a:xfrm>
           <a:prstGeom prst="rect">
             <a:avLst/>
@@ -6849,27 +6849,17 @@
             </a:pPr>
             <a:r>
               <a:rPr lang="en-US" sz="1800" dirty="0"/>
-              <a:t>Manage user </a:t>
-            </a:r>
-            <a:r>
-              <a:rPr lang="en-US" sz="1800" dirty="0" smtClean="0"/>
+              <a:t>Manage </a:t>
+            </a:r>
+            <a:r>
+              <a:rPr lang="en-US" sz="1800"/>
+              <a:t>user </a:t>
+            </a:r>
+            <a:r>
+              <a:rPr lang="en-US" sz="1800" smtClean="0"/>
               <a:t>account</a:t>
             </a:r>
-            <a:endParaRPr lang="en-US" sz="1800" u="sng" dirty="0">
-              <a:solidFill>
-                <a:srgbClr val="A88000"/>
-              </a:solidFill>
-            </a:endParaRPr>
-          </a:p>
-          <a:p>
-            <a:pPr marL="579438" lvl="2" indent="-285750">
-              <a:buFont typeface="Arial" panose="020B0604020202020204" pitchFamily="34" charset="0"/>
-              <a:buChar char="•"/>
-            </a:pPr>
-            <a:r>
-              <a:rPr lang="en-US" sz="1800" dirty="0"/>
-              <a:t> </a:t>
-            </a:r>
+            <a:endParaRPr lang="en-US" sz="1800" dirty="0"/>
           </a:p>
           <a:p>
             <a:r>
@@ -6912,7 +6902,6 @@
               <a:rPr lang="en-US" sz="1800" dirty="0" smtClean="0"/>
               <a:t>View past orders and order off of it</a:t>
             </a:r>
-            <a:endParaRPr lang="en-US" sz="1800" dirty="0"/>
           </a:p>
           <a:p>
             <a:pPr marL="579438" lvl="0" indent="-285750">
@@ -6921,8 +6910,17 @@
             </a:pPr>
             <a:r>
               <a:rPr lang="en-US" sz="1800" dirty="0" smtClean="0"/>
-              <a:t>Ability for a restaurant to customize menu options</a:t>
-            </a:r>
+              <a:t>Ability </a:t>
+            </a:r>
+            <a:r>
+              <a:rPr lang="en-US" sz="1800" dirty="0" smtClean="0"/>
+              <a:t>for a restaurant </a:t>
+            </a:r>
+            <a:r>
+              <a:rPr lang="en-US" sz="1800" dirty="0" smtClean="0"/>
+              <a:t>to customize menu options</a:t>
+            </a:r>
+            <a:endParaRPr lang="en-US" sz="1800" dirty="0" smtClean="0"/>
           </a:p>
         </p:txBody>
       </p:sp>
@@ -7037,11 +7035,7 @@
           <a:p>
             <a:r>
               <a:rPr lang="en-US" sz="2000" b="1" dirty="0" smtClean="0"/>
-              <a:t>Adam Permann</a:t>
-            </a:r>
-            <a:r>
-              <a:rPr lang="en-US" sz="2000" b="1" dirty="0" smtClean="0"/>
-              <a:t>:</a:t>
+              <a:t>Adam Permann:</a:t>
             </a:r>
             <a:r>
               <a:rPr lang="en-US" sz="2000" dirty="0"/>
@@ -7051,7 +7045,6 @@
               <a:rPr lang="en-US" sz="2000" dirty="0" smtClean="0"/>
               <a:t>Front End Developer, UX</a:t>
             </a:r>
-            <a:endParaRPr lang="en-US" sz="2000" dirty="0" smtClean="0"/>
           </a:p>
           <a:p>
             <a:r>
@@ -7090,11 +7083,7 @@
             </a:r>
             <a:r>
               <a:rPr lang="en-US" sz="2000" b="1" smtClean="0"/>
-              <a:t>Vandehey</a:t>
-            </a:r>
-            <a:r>
-              <a:rPr lang="en-US" sz="2000" b="1" smtClean="0"/>
-              <a:t>:</a:t>
+              <a:t>Vandehey:</a:t>
             </a:r>
             <a:r>
               <a:rPr lang="en-US" sz="2000" smtClean="0"/>
@@ -7102,11 +7091,7 @@
             </a:r>
             <a:r>
               <a:rPr lang="en-US" sz="2000" dirty="0" smtClean="0"/>
-              <a:t> Developer, Database Desi</a:t>
-            </a:r>
-            <a:r>
-              <a:rPr lang="en-US" sz="2000" dirty="0" smtClean="0"/>
-              <a:t>gn</a:t>
+              <a:t> Developer, Database Design</a:t>
             </a:r>
             <a:endParaRPr lang="en-US" sz="2000" b="1" dirty="0"/>
           </a:p>

</xml_diff>